<commit_message>
Excel export in new Certe style
</commit_message>
<xml_diff>
--- a/inst/exceltemplate/tablestyles.pptx
+++ b/inst/exceltemplate/tablestyles.pptx
@@ -107,6 +107,11 @@
       </a:defRPr>
     </a:lvl9pPr>
   </p:defaultTextStyle>
+  <p:extLst>
+    <p:ext uri="{EFAFB233-063F-42B5-8137-9DF3F51BA10A}">
+      <p15:sldGuideLst xmlns:p15="http://schemas.microsoft.com/office/powerpoint/2012/main"/>
+    </p:ext>
+  </p:extLst>
 </p:presentation>
 </file>
 
@@ -192,7 +197,7 @@
           <a:p>
             <a:fld id="{AEDB0DC3-270A-CC40-91C8-928DC042328A}" type="datetimeFigureOut">
               <a:rPr lang="nl-NL" smtClean="0"/>
-              <a:t>12-04-2022</a:t>
+              <a:t>17-04-2024</a:t>
             </a:fld>
             <a:endParaRPr lang="nl-NL"/>
           </a:p>
@@ -680,7 +685,7 @@
           <a:p>
             <a:fld id="{323A7EA5-2BAA-A142-9E34-2CAF8C9D07B0}" type="datetimeFigureOut">
               <a:rPr lang="nl-NL" smtClean="0"/>
-              <a:t>12-04-2022</a:t>
+              <a:t>17-04-2024</a:t>
             </a:fld>
             <a:endParaRPr lang="nl-NL"/>
           </a:p>
@@ -850,7 +855,7 @@
           <a:p>
             <a:fld id="{323A7EA5-2BAA-A142-9E34-2CAF8C9D07B0}" type="datetimeFigureOut">
               <a:rPr lang="nl-NL" smtClean="0"/>
-              <a:t>12-04-2022</a:t>
+              <a:t>17-04-2024</a:t>
             </a:fld>
             <a:endParaRPr lang="nl-NL"/>
           </a:p>
@@ -1030,7 +1035,7 @@
           <a:p>
             <a:fld id="{323A7EA5-2BAA-A142-9E34-2CAF8C9D07B0}" type="datetimeFigureOut">
               <a:rPr lang="nl-NL" smtClean="0"/>
-              <a:t>12-04-2022</a:t>
+              <a:t>17-04-2024</a:t>
             </a:fld>
             <a:endParaRPr lang="nl-NL"/>
           </a:p>
@@ -1200,7 +1205,7 @@
           <a:p>
             <a:fld id="{323A7EA5-2BAA-A142-9E34-2CAF8C9D07B0}" type="datetimeFigureOut">
               <a:rPr lang="nl-NL" smtClean="0"/>
-              <a:t>12-04-2022</a:t>
+              <a:t>17-04-2024</a:t>
             </a:fld>
             <a:endParaRPr lang="nl-NL"/>
           </a:p>
@@ -1444,7 +1449,7 @@
           <a:p>
             <a:fld id="{323A7EA5-2BAA-A142-9E34-2CAF8C9D07B0}" type="datetimeFigureOut">
               <a:rPr lang="nl-NL" smtClean="0"/>
-              <a:t>12-04-2022</a:t>
+              <a:t>17-04-2024</a:t>
             </a:fld>
             <a:endParaRPr lang="nl-NL"/>
           </a:p>
@@ -1676,7 +1681,7 @@
           <a:p>
             <a:fld id="{323A7EA5-2BAA-A142-9E34-2CAF8C9D07B0}" type="datetimeFigureOut">
               <a:rPr lang="nl-NL" smtClean="0"/>
-              <a:t>12-04-2022</a:t>
+              <a:t>17-04-2024</a:t>
             </a:fld>
             <a:endParaRPr lang="nl-NL"/>
           </a:p>
@@ -2043,7 +2048,7 @@
           <a:p>
             <a:fld id="{323A7EA5-2BAA-A142-9E34-2CAF8C9D07B0}" type="datetimeFigureOut">
               <a:rPr lang="nl-NL" smtClean="0"/>
-              <a:t>12-04-2022</a:t>
+              <a:t>17-04-2024</a:t>
             </a:fld>
             <a:endParaRPr lang="nl-NL"/>
           </a:p>
@@ -2161,7 +2166,7 @@
           <a:p>
             <a:fld id="{323A7EA5-2BAA-A142-9E34-2CAF8C9D07B0}" type="datetimeFigureOut">
               <a:rPr lang="nl-NL" smtClean="0"/>
-              <a:t>12-04-2022</a:t>
+              <a:t>17-04-2024</a:t>
             </a:fld>
             <a:endParaRPr lang="nl-NL"/>
           </a:p>
@@ -2256,7 +2261,7 @@
           <a:p>
             <a:fld id="{323A7EA5-2BAA-A142-9E34-2CAF8C9D07B0}" type="datetimeFigureOut">
               <a:rPr lang="nl-NL" smtClean="0"/>
-              <a:t>12-04-2022</a:t>
+              <a:t>17-04-2024</a:t>
             </a:fld>
             <a:endParaRPr lang="nl-NL"/>
           </a:p>
@@ -2533,7 +2538,7 @@
           <a:p>
             <a:fld id="{323A7EA5-2BAA-A142-9E34-2CAF8C9D07B0}" type="datetimeFigureOut">
               <a:rPr lang="nl-NL" smtClean="0"/>
-              <a:t>12-04-2022</a:t>
+              <a:t>17-04-2024</a:t>
             </a:fld>
             <a:endParaRPr lang="nl-NL"/>
           </a:p>
@@ -2790,7 +2795,7 @@
           <a:p>
             <a:fld id="{323A7EA5-2BAA-A142-9E34-2CAF8C9D07B0}" type="datetimeFigureOut">
               <a:rPr lang="nl-NL" smtClean="0"/>
-              <a:t>12-04-2022</a:t>
+              <a:t>17-04-2024</a:t>
             </a:fld>
             <a:endParaRPr lang="nl-NL"/>
           </a:p>
@@ -3003,7 +3008,7 @@
           <a:p>
             <a:fld id="{323A7EA5-2BAA-A142-9E34-2CAF8C9D07B0}" type="datetimeFigureOut">
               <a:rPr lang="nl-NL" smtClean="0"/>
-              <a:t>12-04-2022</a:t>
+              <a:t>17-04-2024</a:t>
             </a:fld>
             <a:endParaRPr lang="nl-NL"/>
           </a:p>
@@ -3408,12 +3413,361 @@
           <a:chExt cx="0" cy="0"/>
         </a:xfrm>
       </p:grpSpPr>
+      <p:sp>
+        <p:nvSpPr>
+          <p:cNvPr id="16" name="TextBox 15">
+            <a:extLst>
+              <a:ext uri="{FF2B5EF4-FFF2-40B4-BE49-F238E27FC236}">
+                <a16:creationId xmlns:a16="http://schemas.microsoft.com/office/drawing/2014/main" id="{9BFD9C23-20A4-D349-8145-4169146028F8}"/>
+              </a:ext>
+            </a:extLst>
+          </p:cNvPr>
+          <p:cNvSpPr txBox="1"/>
+          <p:nvPr/>
+        </p:nvSpPr>
+        <p:spPr>
+          <a:xfrm>
+            <a:off x="165104" y="432082"/>
+            <a:ext cx="3366627" cy="153888"/>
+          </a:xfrm>
+          <a:prstGeom prst="rect">
+            <a:avLst/>
+          </a:prstGeom>
+          <a:noFill/>
+        </p:spPr>
+        <p:txBody>
+          <a:bodyPr wrap="none" rtlCol="0">
+            <a:spAutoFit/>
+          </a:bodyPr>
+          <a:lstStyle/>
+          <a:p>
+            <a:r>
+              <a:rPr lang="nl-NL" sz="400" dirty="0">
+                <a:latin typeface=""/>
+              </a:rPr>
+              <a:t>None                TableStyleLight1        TableStyleLight2         TableStyleLight3       TableStyleLight4      TableStyleLight5       TableStyleLight6</a:t>
+            </a:r>
+          </a:p>
+        </p:txBody>
+      </p:sp>
+      <p:sp>
+        <p:nvSpPr>
+          <p:cNvPr id="17" name="TextBox 16">
+            <a:extLst>
+              <a:ext uri="{FF2B5EF4-FFF2-40B4-BE49-F238E27FC236}">
+                <a16:creationId xmlns:a16="http://schemas.microsoft.com/office/drawing/2014/main" id="{909A6043-6BD4-1346-AA63-1EC757928459}"/>
+              </a:ext>
+            </a:extLst>
+          </p:cNvPr>
+          <p:cNvSpPr txBox="1"/>
+          <p:nvPr/>
+        </p:nvSpPr>
+        <p:spPr>
+          <a:xfrm>
+            <a:off x="52684" y="1010118"/>
+            <a:ext cx="3512500" cy="153888"/>
+          </a:xfrm>
+          <a:prstGeom prst="rect">
+            <a:avLst/>
+          </a:prstGeom>
+          <a:noFill/>
+        </p:spPr>
+        <p:txBody>
+          <a:bodyPr wrap="none" rtlCol="0">
+            <a:spAutoFit/>
+          </a:bodyPr>
+          <a:lstStyle/>
+          <a:p>
+            <a:r>
+              <a:rPr lang="nl-NL" sz="400" dirty="0">
+                <a:latin typeface=""/>
+              </a:rPr>
+              <a:t>TableStyleLight7       TableStyleLight8        TableStyleLight9      TableStyleLight10      TableStyleLight11      TableStyleLight12    TableStyleLight13</a:t>
+            </a:r>
+          </a:p>
+        </p:txBody>
+      </p:sp>
+      <p:sp>
+        <p:nvSpPr>
+          <p:cNvPr id="18" name="TextBox 17">
+            <a:extLst>
+              <a:ext uri="{FF2B5EF4-FFF2-40B4-BE49-F238E27FC236}">
+                <a16:creationId xmlns:a16="http://schemas.microsoft.com/office/drawing/2014/main" id="{CE7C7181-91A3-B547-A89C-7CC5E8ECF939}"/>
+              </a:ext>
+            </a:extLst>
+          </p:cNvPr>
+          <p:cNvSpPr txBox="1"/>
+          <p:nvPr/>
+        </p:nvSpPr>
+        <p:spPr>
+          <a:xfrm>
+            <a:off x="26342" y="1605857"/>
+            <a:ext cx="3526928" cy="153888"/>
+          </a:xfrm>
+          <a:prstGeom prst="rect">
+            <a:avLst/>
+          </a:prstGeom>
+          <a:noFill/>
+        </p:spPr>
+        <p:txBody>
+          <a:bodyPr wrap="none" rtlCol="0">
+            <a:spAutoFit/>
+          </a:bodyPr>
+          <a:lstStyle/>
+          <a:p>
+            <a:r>
+              <a:rPr lang="nl-NL" sz="400" dirty="0">
+                <a:latin typeface=""/>
+              </a:rPr>
+              <a:t>TableStyleLight14      TableStyleLight15      TableStyleLight16     TableStyleLight17     TableStyleLight18     TableStyleLight19     TableStyleLight20</a:t>
+            </a:r>
+          </a:p>
+        </p:txBody>
+      </p:sp>
+      <p:sp>
+        <p:nvSpPr>
+          <p:cNvPr id="19" name="TextBox 18">
+            <a:extLst>
+              <a:ext uri="{FF2B5EF4-FFF2-40B4-BE49-F238E27FC236}">
+                <a16:creationId xmlns:a16="http://schemas.microsoft.com/office/drawing/2014/main" id="{145972DE-0FD6-174E-9B4B-199B68B4D6BC}"/>
+              </a:ext>
+            </a:extLst>
+          </p:cNvPr>
+          <p:cNvSpPr txBox="1"/>
+          <p:nvPr/>
+        </p:nvSpPr>
+        <p:spPr>
+          <a:xfrm>
+            <a:off x="63663" y="2174318"/>
+            <a:ext cx="3563796" cy="149272"/>
+          </a:xfrm>
+          <a:prstGeom prst="rect">
+            <a:avLst/>
+          </a:prstGeom>
+          <a:noFill/>
+        </p:spPr>
+        <p:txBody>
+          <a:bodyPr wrap="none" rtlCol="0">
+            <a:spAutoFit/>
+          </a:bodyPr>
+          <a:lstStyle/>
+          <a:p>
+            <a:r>
+              <a:rPr lang="nl-NL" sz="370" dirty="0">
+                <a:latin typeface=""/>
+              </a:rPr>
+              <a:t>TableStyleMedium1    TableStyleMedium2       TableStyleMedium3     TableStyleMedium4     TableStyleMedium5      TableStyleMedium6     TableStyleMedium7</a:t>
+            </a:r>
+          </a:p>
+        </p:txBody>
+      </p:sp>
+      <p:sp>
+        <p:nvSpPr>
+          <p:cNvPr id="20" name="TextBox 19">
+            <a:extLst>
+              <a:ext uri="{FF2B5EF4-FFF2-40B4-BE49-F238E27FC236}">
+                <a16:creationId xmlns:a16="http://schemas.microsoft.com/office/drawing/2014/main" id="{C769BDA7-4264-9B4E-BBDA-514373F3AF76}"/>
+              </a:ext>
+            </a:extLst>
+          </p:cNvPr>
+          <p:cNvSpPr txBox="1"/>
+          <p:nvPr/>
+        </p:nvSpPr>
+        <p:spPr>
+          <a:xfrm>
+            <a:off x="79137" y="2748672"/>
+            <a:ext cx="3538148" cy="149272"/>
+          </a:xfrm>
+          <a:prstGeom prst="rect">
+            <a:avLst/>
+          </a:prstGeom>
+          <a:noFill/>
+        </p:spPr>
+        <p:txBody>
+          <a:bodyPr wrap="none" rtlCol="0">
+            <a:spAutoFit/>
+          </a:bodyPr>
+          <a:lstStyle/>
+          <a:p>
+            <a:r>
+              <a:rPr lang="nl-NL" sz="370" dirty="0">
+                <a:latin typeface=""/>
+              </a:rPr>
+              <a:t>TableStyleMedium8     TableStyleMedium9    TableStyleMedium10    TableStyleMedium11    TableStyleMedium12    TableStyleMedium13   TableStyleMedium14</a:t>
+            </a:r>
+          </a:p>
+        </p:txBody>
+      </p:sp>
+      <p:sp>
+        <p:nvSpPr>
+          <p:cNvPr id="21" name="TextBox 20">
+            <a:extLst>
+              <a:ext uri="{FF2B5EF4-FFF2-40B4-BE49-F238E27FC236}">
+                <a16:creationId xmlns:a16="http://schemas.microsoft.com/office/drawing/2014/main" id="{31811908-41BD-2F4A-AAC9-E741A63942E4}"/>
+              </a:ext>
+            </a:extLst>
+          </p:cNvPr>
+          <p:cNvSpPr txBox="1"/>
+          <p:nvPr/>
+        </p:nvSpPr>
+        <p:spPr>
+          <a:xfrm>
+            <a:off x="55502" y="3316089"/>
+            <a:ext cx="3550972" cy="149272"/>
+          </a:xfrm>
+          <a:prstGeom prst="rect">
+            <a:avLst/>
+          </a:prstGeom>
+          <a:noFill/>
+        </p:spPr>
+        <p:txBody>
+          <a:bodyPr wrap="none" rtlCol="0">
+            <a:spAutoFit/>
+          </a:bodyPr>
+          <a:lstStyle/>
+          <a:p>
+            <a:r>
+              <a:rPr lang="nl-NL" sz="370" dirty="0">
+                <a:latin typeface=""/>
+              </a:rPr>
+              <a:t>TableStyleMedium15   TableStyleMedium16   TableStyleMedium17    TableStyleMedium18    TableStyleMedium19    TableStyleMedium20   TableStyleMedium21</a:t>
+            </a:r>
+          </a:p>
+        </p:txBody>
+      </p:sp>
+      <p:sp>
+        <p:nvSpPr>
+          <p:cNvPr id="22" name="TextBox 21">
+            <a:extLst>
+              <a:ext uri="{FF2B5EF4-FFF2-40B4-BE49-F238E27FC236}">
+                <a16:creationId xmlns:a16="http://schemas.microsoft.com/office/drawing/2014/main" id="{D840B069-C2CB-7147-88CE-DBA4D5A8599A}"/>
+              </a:ext>
+            </a:extLst>
+          </p:cNvPr>
+          <p:cNvSpPr txBox="1"/>
+          <p:nvPr/>
+        </p:nvSpPr>
+        <p:spPr>
+          <a:xfrm>
+            <a:off x="72157" y="3885997"/>
+            <a:ext cx="3446777" cy="153888"/>
+          </a:xfrm>
+          <a:prstGeom prst="rect">
+            <a:avLst/>
+          </a:prstGeom>
+          <a:noFill/>
+        </p:spPr>
+        <p:txBody>
+          <a:bodyPr wrap="none" rtlCol="0">
+            <a:spAutoFit/>
+          </a:bodyPr>
+          <a:lstStyle/>
+          <a:p>
+            <a:r>
+              <a:rPr lang="nl-NL" sz="400" dirty="0">
+                <a:latin typeface=""/>
+              </a:rPr>
+              <a:t>TableStyleDark1        TableStyleDark2       TableStyleDark3       TableStyleDark4       TableStyleDark5        TableStyleDark6      TableStyleDark7</a:t>
+            </a:r>
+          </a:p>
+        </p:txBody>
+      </p:sp>
       <p:pic>
         <p:nvPicPr>
-          <p:cNvPr id="7" name="Picture 6" descr="Table&#10;&#10;Description automatically generated">
+          <p:cNvPr id="4" name="Picture 3">
             <a:extLst>
               <a:ext uri="{FF2B5EF4-FFF2-40B4-BE49-F238E27FC236}">
-                <a16:creationId xmlns:a16="http://schemas.microsoft.com/office/drawing/2014/main" id="{B35ADEAC-2B63-DC4E-8262-9DD4C13B3E68}"/>
+                <a16:creationId xmlns:a16="http://schemas.microsoft.com/office/drawing/2014/main" id="{CB4CAE62-66F2-FCC8-63E2-D7C4499C9C04}"/>
+              </a:ext>
+            </a:extLst>
+          </p:cNvPr>
+          <p:cNvPicPr>
+            <a:picLocks noChangeAspect="1"/>
+          </p:cNvPicPr>
+          <p:nvPr/>
+        </p:nvPicPr>
+        <p:blipFill>
+          <a:blip r:embed="rId3"/>
+          <a:stretch>
+            <a:fillRect/>
+          </a:stretch>
+        </p:blipFill>
+        <p:spPr>
+          <a:xfrm>
+            <a:off x="143802" y="115946"/>
+            <a:ext cx="3312846" cy="360843"/>
+          </a:xfrm>
+          <a:prstGeom prst="rect">
+            <a:avLst/>
+          </a:prstGeom>
+        </p:spPr>
+      </p:pic>
+      <p:pic>
+        <p:nvPicPr>
+          <p:cNvPr id="5" name="Picture 4">
+            <a:extLst>
+              <a:ext uri="{FF2B5EF4-FFF2-40B4-BE49-F238E27FC236}">
+                <a16:creationId xmlns:a16="http://schemas.microsoft.com/office/drawing/2014/main" id="{A5AA1251-5EE0-EA4B-BFBB-1DFEB629872E}"/>
+              </a:ext>
+            </a:extLst>
+          </p:cNvPr>
+          <p:cNvPicPr>
+            <a:picLocks noChangeAspect="1"/>
+          </p:cNvPicPr>
+          <p:nvPr/>
+        </p:nvPicPr>
+        <p:blipFill>
+          <a:blip r:embed="rId4"/>
+          <a:stretch>
+            <a:fillRect/>
+          </a:stretch>
+        </p:blipFill>
+        <p:spPr>
+          <a:xfrm>
+            <a:off x="120851" y="682599"/>
+            <a:ext cx="3358748" cy="362371"/>
+          </a:xfrm>
+          <a:prstGeom prst="rect">
+            <a:avLst/>
+          </a:prstGeom>
+        </p:spPr>
+      </p:pic>
+      <p:pic>
+        <p:nvPicPr>
+          <p:cNvPr id="6" name="Picture 5">
+            <a:extLst>
+              <a:ext uri="{FF2B5EF4-FFF2-40B4-BE49-F238E27FC236}">
+                <a16:creationId xmlns:a16="http://schemas.microsoft.com/office/drawing/2014/main" id="{6EE91E09-06DC-0814-9B8D-1B1E57E0E94B}"/>
+              </a:ext>
+            </a:extLst>
+          </p:cNvPr>
+          <p:cNvPicPr>
+            <a:picLocks noChangeAspect="1"/>
+          </p:cNvPicPr>
+          <p:nvPr/>
+        </p:nvPicPr>
+        <p:blipFill>
+          <a:blip r:embed="rId5"/>
+          <a:stretch>
+            <a:fillRect/>
+          </a:stretch>
+        </p:blipFill>
+        <p:spPr>
+          <a:xfrm>
+            <a:off x="124951" y="1280932"/>
+            <a:ext cx="3348097" cy="353043"/>
+          </a:xfrm>
+          <a:prstGeom prst="rect">
+            <a:avLst/>
+          </a:prstGeom>
+        </p:spPr>
+      </p:pic>
+      <p:pic>
+        <p:nvPicPr>
+          <p:cNvPr id="12" name="Picture 11">
+            <a:extLst>
+              <a:ext uri="{FF2B5EF4-FFF2-40B4-BE49-F238E27FC236}">
+                <a16:creationId xmlns:a16="http://schemas.microsoft.com/office/drawing/2014/main" id="{ACD1C78B-E032-D0E3-8E2E-EECC8E15B13E}"/>
               </a:ext>
             </a:extLst>
           </p:cNvPr>
@@ -3423,14 +3777,14 @@
           <p:nvPr/>
         </p:nvPicPr>
         <p:blipFill rotWithShape="1">
-          <a:blip r:embed="rId3"/>
-          <a:srcRect l="1764" t="62437" r="4585" b="30163"/>
+          <a:blip r:embed="rId6"/>
+          <a:srcRect t="2337" b="1"/>
           <a:stretch/>
         </p:blipFill>
         <p:spPr>
           <a:xfrm>
-            <a:off x="114300" y="2990963"/>
-            <a:ext cx="3371850" cy="355600"/>
+            <a:off x="131501" y="1838324"/>
+            <a:ext cx="3348098" cy="381795"/>
           </a:xfrm>
           <a:prstGeom prst="rect">
             <a:avLst/>
@@ -3439,10 +3793,70 @@
       </p:pic>
       <p:pic>
         <p:nvPicPr>
-          <p:cNvPr id="8" name="Picture 7" descr="Table&#10;&#10;Description automatically generated">
+          <p:cNvPr id="15" name="Picture 14">
             <a:extLst>
               <a:ext uri="{FF2B5EF4-FFF2-40B4-BE49-F238E27FC236}">
-                <a16:creationId xmlns:a16="http://schemas.microsoft.com/office/drawing/2014/main" id="{C4283920-A1E5-AA4D-817B-B36348734626}"/>
+                <a16:creationId xmlns:a16="http://schemas.microsoft.com/office/drawing/2014/main" id="{5553008D-78A7-1CAA-1831-9A45D391F660}"/>
+              </a:ext>
+            </a:extLst>
+          </p:cNvPr>
+          <p:cNvPicPr>
+            <a:picLocks noChangeAspect="1"/>
+          </p:cNvPicPr>
+          <p:nvPr/>
+        </p:nvPicPr>
+        <p:blipFill>
+          <a:blip r:embed="rId7"/>
+          <a:stretch>
+            <a:fillRect/>
+          </a:stretch>
+        </p:blipFill>
+        <p:spPr>
+          <a:xfrm>
+            <a:off x="120851" y="2421169"/>
+            <a:ext cx="3352197" cy="345308"/>
+          </a:xfrm>
+          <a:prstGeom prst="rect">
+            <a:avLst/>
+          </a:prstGeom>
+        </p:spPr>
+      </p:pic>
+      <p:pic>
+        <p:nvPicPr>
+          <p:cNvPr id="23" name="Picture 22">
+            <a:extLst>
+              <a:ext uri="{FF2B5EF4-FFF2-40B4-BE49-F238E27FC236}">
+                <a16:creationId xmlns:a16="http://schemas.microsoft.com/office/drawing/2014/main" id="{68C2BB7F-F0A1-577D-CAB0-8FE778AE2F34}"/>
+              </a:ext>
+            </a:extLst>
+          </p:cNvPr>
+          <p:cNvPicPr>
+            <a:picLocks noChangeAspect="1"/>
+          </p:cNvPicPr>
+          <p:nvPr/>
+        </p:nvPicPr>
+        <p:blipFill>
+          <a:blip r:embed="rId8"/>
+          <a:stretch>
+            <a:fillRect/>
+          </a:stretch>
+        </p:blipFill>
+        <p:spPr>
+          <a:xfrm>
+            <a:off x="146254" y="3005001"/>
+            <a:ext cx="3335796" cy="356024"/>
+          </a:xfrm>
+          <a:prstGeom prst="rect">
+            <a:avLst/>
+          </a:prstGeom>
+        </p:spPr>
+      </p:pic>
+      <p:pic>
+        <p:nvPicPr>
+          <p:cNvPr id="24" name="Picture 23">
+            <a:extLst>
+              <a:ext uri="{FF2B5EF4-FFF2-40B4-BE49-F238E27FC236}">
+                <a16:creationId xmlns:a16="http://schemas.microsoft.com/office/drawing/2014/main" id="{887A6480-C7DF-6A85-B95B-140117E7B2FF}"/>
               </a:ext>
             </a:extLst>
           </p:cNvPr>
@@ -3452,410 +3866,31 @@
           <p:nvPr/>
         </p:nvPicPr>
         <p:blipFill rotWithShape="1">
-          <a:blip r:embed="rId3"/>
-          <a:srcRect l="1764" t="4558" r="4585" b="88042"/>
+          <a:blip r:embed="rId9">
+            <a:clrChange>
+              <a:clrFrom>
+                <a:srgbClr val="ECECEC"/>
+              </a:clrFrom>
+              <a:clrTo>
+                <a:srgbClr val="ECECEC">
+                  <a:alpha val="0"/>
+                </a:srgbClr>
+              </a:clrTo>
+            </a:clrChange>
+          </a:blip>
+          <a:srcRect l="3075" t="25466" r="7182" b="22115"/>
           <a:stretch/>
         </p:blipFill>
         <p:spPr>
           <a:xfrm>
-            <a:off x="114300" y="110755"/>
-            <a:ext cx="3371850" cy="355600"/>
+            <a:off x="137697" y="3570996"/>
+            <a:ext cx="3335796" cy="351359"/>
           </a:xfrm>
           <a:prstGeom prst="rect">
             <a:avLst/>
           </a:prstGeom>
         </p:spPr>
       </p:pic>
-      <p:pic>
-        <p:nvPicPr>
-          <p:cNvPr id="9" name="Picture 8" descr="Table&#10;&#10;Description automatically generated">
-            <a:extLst>
-              <a:ext uri="{FF2B5EF4-FFF2-40B4-BE49-F238E27FC236}">
-                <a16:creationId xmlns:a16="http://schemas.microsoft.com/office/drawing/2014/main" id="{55F85FFF-949A-8641-AA05-13C79EC45EA4}"/>
-              </a:ext>
-            </a:extLst>
-          </p:cNvPr>
-          <p:cNvPicPr>
-            <a:picLocks noChangeAspect="1"/>
-          </p:cNvPicPr>
-          <p:nvPr/>
-        </p:nvPicPr>
-        <p:blipFill rotWithShape="1">
-          <a:blip r:embed="rId3"/>
-          <a:srcRect l="1764" t="12487" r="4585" b="80113"/>
-          <a:stretch/>
-        </p:blipFill>
-        <p:spPr>
-          <a:xfrm>
-            <a:off x="114300" y="691978"/>
-            <a:ext cx="3371850" cy="355600"/>
-          </a:xfrm>
-          <a:prstGeom prst="rect">
-            <a:avLst/>
-          </a:prstGeom>
-        </p:spPr>
-      </p:pic>
-      <p:pic>
-        <p:nvPicPr>
-          <p:cNvPr id="10" name="Picture 9" descr="Table&#10;&#10;Description automatically generated">
-            <a:extLst>
-              <a:ext uri="{FF2B5EF4-FFF2-40B4-BE49-F238E27FC236}">
-                <a16:creationId xmlns:a16="http://schemas.microsoft.com/office/drawing/2014/main" id="{F95EF0A7-2468-274E-A260-0F6B680F48EF}"/>
-              </a:ext>
-            </a:extLst>
-          </p:cNvPr>
-          <p:cNvPicPr>
-            <a:picLocks noChangeAspect="1"/>
-          </p:cNvPicPr>
-          <p:nvPr/>
-        </p:nvPicPr>
-        <p:blipFill rotWithShape="1">
-          <a:blip r:embed="rId3"/>
-          <a:srcRect l="1764" t="20018" r="4585" b="72581"/>
-          <a:stretch/>
-        </p:blipFill>
-        <p:spPr>
-          <a:xfrm>
-            <a:off x="114300" y="1273201"/>
-            <a:ext cx="3371850" cy="355600"/>
-          </a:xfrm>
-          <a:prstGeom prst="rect">
-            <a:avLst/>
-          </a:prstGeom>
-        </p:spPr>
-      </p:pic>
-      <p:pic>
-        <p:nvPicPr>
-          <p:cNvPr id="11" name="Picture 10" descr="Table&#10;&#10;Description automatically generated">
-            <a:extLst>
-              <a:ext uri="{FF2B5EF4-FFF2-40B4-BE49-F238E27FC236}">
-                <a16:creationId xmlns:a16="http://schemas.microsoft.com/office/drawing/2014/main" id="{CFE00B9E-356F-574F-BB6D-053464AABEEC}"/>
-              </a:ext>
-            </a:extLst>
-          </p:cNvPr>
-          <p:cNvPicPr>
-            <a:picLocks noChangeAspect="1"/>
-          </p:cNvPicPr>
-          <p:nvPr/>
-        </p:nvPicPr>
-        <p:blipFill rotWithShape="1">
-          <a:blip r:embed="rId3"/>
-          <a:srcRect l="1764" t="38916" r="4585" b="53172"/>
-          <a:stretch/>
-        </p:blipFill>
-        <p:spPr>
-          <a:xfrm>
-            <a:off x="117494" y="1851517"/>
-            <a:ext cx="3371850" cy="380206"/>
-          </a:xfrm>
-          <a:prstGeom prst="rect">
-            <a:avLst/>
-          </a:prstGeom>
-        </p:spPr>
-      </p:pic>
-      <p:pic>
-        <p:nvPicPr>
-          <p:cNvPr id="13" name="Picture 12" descr="Table&#10;&#10;Description automatically generated">
-            <a:extLst>
-              <a:ext uri="{FF2B5EF4-FFF2-40B4-BE49-F238E27FC236}">
-                <a16:creationId xmlns:a16="http://schemas.microsoft.com/office/drawing/2014/main" id="{ABD1FA44-AC2A-F94D-BAE9-5688EEC6B5D2}"/>
-              </a:ext>
-            </a:extLst>
-          </p:cNvPr>
-          <p:cNvPicPr>
-            <a:picLocks noChangeAspect="1"/>
-          </p:cNvPicPr>
-          <p:nvPr/>
-        </p:nvPicPr>
-        <p:blipFill rotWithShape="1">
-          <a:blip r:embed="rId3"/>
-          <a:srcRect l="1764" t="54509" r="4585" b="37579"/>
-          <a:stretch/>
-        </p:blipFill>
-        <p:spPr>
-          <a:xfrm>
-            <a:off x="125167" y="2416054"/>
-            <a:ext cx="3371850" cy="380206"/>
-          </a:xfrm>
-          <a:prstGeom prst="rect">
-            <a:avLst/>
-          </a:prstGeom>
-        </p:spPr>
-      </p:pic>
-      <p:pic>
-        <p:nvPicPr>
-          <p:cNvPr id="14" name="Picture 13" descr="Table&#10;&#10;Description automatically generated">
-            <a:extLst>
-              <a:ext uri="{FF2B5EF4-FFF2-40B4-BE49-F238E27FC236}">
-                <a16:creationId xmlns:a16="http://schemas.microsoft.com/office/drawing/2014/main" id="{E03C2BFD-554B-DF4F-8934-B16F47A4525A}"/>
-              </a:ext>
-            </a:extLst>
-          </p:cNvPr>
-          <p:cNvPicPr>
-            <a:picLocks noChangeAspect="1"/>
-          </p:cNvPicPr>
-          <p:nvPr/>
-        </p:nvPicPr>
-        <p:blipFill rotWithShape="1">
-          <a:blip r:embed="rId3"/>
-          <a:srcRect l="1764" t="73670" r="4585" b="18930"/>
-          <a:stretch/>
-        </p:blipFill>
-        <p:spPr>
-          <a:xfrm>
-            <a:off x="114300" y="3568418"/>
-            <a:ext cx="3371850" cy="355600"/>
-          </a:xfrm>
-          <a:prstGeom prst="rect">
-            <a:avLst/>
-          </a:prstGeom>
-        </p:spPr>
-      </p:pic>
-      <p:sp>
-        <p:nvSpPr>
-          <p:cNvPr id="16" name="TextBox 15">
-            <a:extLst>
-              <a:ext uri="{FF2B5EF4-FFF2-40B4-BE49-F238E27FC236}">
-                <a16:creationId xmlns:a16="http://schemas.microsoft.com/office/drawing/2014/main" id="{9BFD9C23-20A4-D349-8145-4169146028F8}"/>
-              </a:ext>
-            </a:extLst>
-          </p:cNvPr>
-          <p:cNvSpPr txBox="1"/>
-          <p:nvPr/>
-        </p:nvSpPr>
-        <p:spPr>
-          <a:xfrm>
-            <a:off x="165104" y="432082"/>
-            <a:ext cx="3408305" cy="169277"/>
-          </a:xfrm>
-          <a:prstGeom prst="rect">
-            <a:avLst/>
-          </a:prstGeom>
-          <a:noFill/>
-        </p:spPr>
-        <p:txBody>
-          <a:bodyPr wrap="none" rtlCol="0">
-            <a:spAutoFit/>
-          </a:bodyPr>
-          <a:lstStyle/>
-          <a:p>
-            <a:r>
-              <a:rPr lang="nl-NL" sz="500" dirty="0"/>
-              <a:t>None                TableStyleLight1    TableStyleLight2    TableStyleLight3     TableStyleLight4    TableStyleLight5    TableStyleLight6</a:t>
-            </a:r>
-          </a:p>
-        </p:txBody>
-      </p:sp>
-      <p:sp>
-        <p:nvSpPr>
-          <p:cNvPr id="17" name="TextBox 16">
-            <a:extLst>
-              <a:ext uri="{FF2B5EF4-FFF2-40B4-BE49-F238E27FC236}">
-                <a16:creationId xmlns:a16="http://schemas.microsoft.com/office/drawing/2014/main" id="{909A6043-6BD4-1346-AA63-1EC757928459}"/>
-              </a:ext>
-            </a:extLst>
-          </p:cNvPr>
-          <p:cNvSpPr txBox="1"/>
-          <p:nvPr/>
-        </p:nvSpPr>
-        <p:spPr>
-          <a:xfrm>
-            <a:off x="52684" y="1010118"/>
-            <a:ext cx="3547766" cy="169277"/>
-          </a:xfrm>
-          <a:prstGeom prst="rect">
-            <a:avLst/>
-          </a:prstGeom>
-          <a:noFill/>
-        </p:spPr>
-        <p:txBody>
-          <a:bodyPr wrap="none" rtlCol="0">
-            <a:spAutoFit/>
-          </a:bodyPr>
-          <a:lstStyle/>
-          <a:p>
-            <a:r>
-              <a:rPr lang="nl-NL" sz="500" dirty="0"/>
-              <a:t>TableStyleLight7    TableStyleLight8    TableStyleLight9    TableStyleLight10  TableStyleLight11 TableStyleLight12   TableStyleLight13</a:t>
-            </a:r>
-          </a:p>
-        </p:txBody>
-      </p:sp>
-      <p:sp>
-        <p:nvSpPr>
-          <p:cNvPr id="18" name="TextBox 17">
-            <a:extLst>
-              <a:ext uri="{FF2B5EF4-FFF2-40B4-BE49-F238E27FC236}">
-                <a16:creationId xmlns:a16="http://schemas.microsoft.com/office/drawing/2014/main" id="{CE7C7181-91A3-B547-A89C-7CC5E8ECF939}"/>
-              </a:ext>
-            </a:extLst>
-          </p:cNvPr>
-          <p:cNvSpPr txBox="1"/>
-          <p:nvPr/>
-        </p:nvSpPr>
-        <p:spPr>
-          <a:xfrm>
-            <a:off x="26342" y="1605857"/>
-            <a:ext cx="3610284" cy="169277"/>
-          </a:xfrm>
-          <a:prstGeom prst="rect">
-            <a:avLst/>
-          </a:prstGeom>
-          <a:noFill/>
-        </p:spPr>
-        <p:txBody>
-          <a:bodyPr wrap="none" rtlCol="0">
-            <a:spAutoFit/>
-          </a:bodyPr>
-          <a:lstStyle/>
-          <a:p>
-            <a:r>
-              <a:rPr lang="nl-NL" sz="500" dirty="0"/>
-              <a:t>TableStyleLight14   TableStyleLight15  TableStyleLight16  TableStyleLight17 TableStyleLight18  TableStyleLight19   TableStyleLight20</a:t>
-            </a:r>
-          </a:p>
-        </p:txBody>
-      </p:sp>
-      <p:sp>
-        <p:nvSpPr>
-          <p:cNvPr id="19" name="TextBox 18">
-            <a:extLst>
-              <a:ext uri="{FF2B5EF4-FFF2-40B4-BE49-F238E27FC236}">
-                <a16:creationId xmlns:a16="http://schemas.microsoft.com/office/drawing/2014/main" id="{145972DE-0FD6-174E-9B4B-199B68B4D6BC}"/>
-              </a:ext>
-            </a:extLst>
-          </p:cNvPr>
-          <p:cNvSpPr txBox="1"/>
-          <p:nvPr/>
-        </p:nvSpPr>
-        <p:spPr>
-          <a:xfrm>
-            <a:off x="63663" y="2186618"/>
-            <a:ext cx="3494867" cy="153888"/>
-          </a:xfrm>
-          <a:prstGeom prst="rect">
-            <a:avLst/>
-          </a:prstGeom>
-          <a:noFill/>
-        </p:spPr>
-        <p:txBody>
-          <a:bodyPr wrap="none" rtlCol="0">
-            <a:spAutoFit/>
-          </a:bodyPr>
-          <a:lstStyle/>
-          <a:p>
-            <a:r>
-              <a:rPr lang="nl-NL" sz="400" dirty="0"/>
-              <a:t>TableStyleMedium1     TableStyleMedium2       TableStyleMedium3      TableStyleMedium4       TableStyleMedium5      TableStyleMedium6     TableStyleMedium7</a:t>
-            </a:r>
-          </a:p>
-        </p:txBody>
-      </p:sp>
-      <p:sp>
-        <p:nvSpPr>
-          <p:cNvPr id="20" name="TextBox 19">
-            <a:extLst>
-              <a:ext uri="{FF2B5EF4-FFF2-40B4-BE49-F238E27FC236}">
-                <a16:creationId xmlns:a16="http://schemas.microsoft.com/office/drawing/2014/main" id="{C769BDA7-4264-9B4E-BBDA-514373F3AF76}"/>
-              </a:ext>
-            </a:extLst>
-          </p:cNvPr>
-          <p:cNvSpPr txBox="1"/>
-          <p:nvPr/>
-        </p:nvSpPr>
-        <p:spPr>
-          <a:xfrm>
-            <a:off x="79137" y="2748672"/>
-            <a:ext cx="3494867" cy="153888"/>
-          </a:xfrm>
-          <a:prstGeom prst="rect">
-            <a:avLst/>
-          </a:prstGeom>
-          <a:noFill/>
-        </p:spPr>
-        <p:txBody>
-          <a:bodyPr wrap="none" rtlCol="0">
-            <a:spAutoFit/>
-          </a:bodyPr>
-          <a:lstStyle/>
-          <a:p>
-            <a:r>
-              <a:rPr lang="nl-NL" sz="400" dirty="0"/>
-              <a:t>TableStyleMedium8     TableStyleMedium9    TableStyleMedium10    TableStyleMedium11    TableStyleMedium12    TableStyleMedium13   TableStyleMedium14</a:t>
-            </a:r>
-          </a:p>
-        </p:txBody>
-      </p:sp>
-      <p:sp>
-        <p:nvSpPr>
-          <p:cNvPr id="21" name="TextBox 20">
-            <a:extLst>
-              <a:ext uri="{FF2B5EF4-FFF2-40B4-BE49-F238E27FC236}">
-                <a16:creationId xmlns:a16="http://schemas.microsoft.com/office/drawing/2014/main" id="{31811908-41BD-2F4A-AAC9-E741A63942E4}"/>
-              </a:ext>
-            </a:extLst>
-          </p:cNvPr>
-          <p:cNvSpPr txBox="1"/>
-          <p:nvPr/>
-        </p:nvSpPr>
-        <p:spPr>
-          <a:xfrm>
-            <a:off x="55502" y="3316089"/>
-            <a:ext cx="3539752" cy="153888"/>
-          </a:xfrm>
-          <a:prstGeom prst="rect">
-            <a:avLst/>
-          </a:prstGeom>
-          <a:noFill/>
-        </p:spPr>
-        <p:txBody>
-          <a:bodyPr wrap="none" rtlCol="0">
-            <a:spAutoFit/>
-          </a:bodyPr>
-          <a:lstStyle/>
-          <a:p>
-            <a:r>
-              <a:rPr lang="nl-NL" sz="400" dirty="0"/>
-              <a:t>TableStyleMedium15   TableStyleMedium16   TableStyleMedium17    TableStyleMedium18    TableStyleMedium19    TableStyleMedium20   TableStyleMedium21</a:t>
-            </a:r>
-          </a:p>
-        </p:txBody>
-      </p:sp>
-      <p:sp>
-        <p:nvSpPr>
-          <p:cNvPr id="22" name="TextBox 21">
-            <a:extLst>
-              <a:ext uri="{FF2B5EF4-FFF2-40B4-BE49-F238E27FC236}">
-                <a16:creationId xmlns:a16="http://schemas.microsoft.com/office/drawing/2014/main" id="{D840B069-C2CB-7147-88CE-DBA4D5A8599A}"/>
-              </a:ext>
-            </a:extLst>
-          </p:cNvPr>
-          <p:cNvSpPr txBox="1"/>
-          <p:nvPr/>
-        </p:nvSpPr>
-        <p:spPr>
-          <a:xfrm>
-            <a:off x="72157" y="3885997"/>
-            <a:ext cx="3499676" cy="169277"/>
-          </a:xfrm>
-          <a:prstGeom prst="rect">
-            <a:avLst/>
-          </a:prstGeom>
-          <a:noFill/>
-        </p:spPr>
-        <p:txBody>
-          <a:bodyPr wrap="none" rtlCol="0">
-            <a:spAutoFit/>
-          </a:bodyPr>
-          <a:lstStyle/>
-          <a:p>
-            <a:r>
-              <a:rPr lang="nl-NL" sz="500" dirty="0"/>
-              <a:t>TableStyleDark1   TableStyleDark2     TableStyleDark3     TableStyleDark4    TableStyleDark5    TableStyleDark6     TableStyleDark7</a:t>
-            </a:r>
-          </a:p>
-        </p:txBody>
-      </p:sp>
     </p:spTree>
     <p:extLst>
       <p:ext uri="{BB962C8B-B14F-4D97-AF65-F5344CB8AC3E}">

</xml_diff>